<commit_message>
Fixed wrong sample code
</commit_message>
<xml_diff>
--- a/contents/4/Excelマクロで学ぶVBA入門_第4回.pptx
+++ b/contents/4/Excelマクロで学ぶVBA入門_第4回.pptx
@@ -5789,14 +5789,14 @@
                 <a:gridCol w="1759688">
                   <a:extLst>
                     <a:ext uri="{9D8B030D-6E8A-4147-A177-3AD203B41FA5}">
-                      <a16:colId xmlns:a16="http://schemas.microsoft.com/office/drawing/2014/main" xmlns="" val="20000"/>
+                      <a16:colId xmlns="" xmlns:a16="http://schemas.microsoft.com/office/drawing/2014/main" val="20000"/>
                     </a:ext>
                   </a:extLst>
                 </a:gridCol>
                 <a:gridCol w="1759688">
                   <a:extLst>
                     <a:ext uri="{9D8B030D-6E8A-4147-A177-3AD203B41FA5}">
-                      <a16:colId xmlns:a16="http://schemas.microsoft.com/office/drawing/2014/main" xmlns="" val="20001"/>
+                      <a16:colId xmlns="" xmlns:a16="http://schemas.microsoft.com/office/drawing/2014/main" val="20001"/>
                     </a:ext>
                   </a:extLst>
                 </a:gridCol>
@@ -5910,7 +5910,7 @@
                 </a:tc>
                 <a:extLst>
                   <a:ext uri="{0D108BD9-81ED-4DB2-BD59-A6C34878D82A}">
-                    <a16:rowId xmlns:a16="http://schemas.microsoft.com/office/drawing/2014/main" xmlns="" val="10000"/>
+                    <a16:rowId xmlns="" xmlns:a16="http://schemas.microsoft.com/office/drawing/2014/main" val="10000"/>
                   </a:ext>
                 </a:extLst>
               </a:tr>
@@ -6023,7 +6023,7 @@
                 </a:tc>
                 <a:extLst>
                   <a:ext uri="{0D108BD9-81ED-4DB2-BD59-A6C34878D82A}">
-                    <a16:rowId xmlns:a16="http://schemas.microsoft.com/office/drawing/2014/main" xmlns="" val="10001"/>
+                    <a16:rowId xmlns="" xmlns:a16="http://schemas.microsoft.com/office/drawing/2014/main" val="10001"/>
                   </a:ext>
                 </a:extLst>
               </a:tr>
@@ -6136,7 +6136,7 @@
                 </a:tc>
                 <a:extLst>
                   <a:ext uri="{0D108BD9-81ED-4DB2-BD59-A6C34878D82A}">
-                    <a16:rowId xmlns:a16="http://schemas.microsoft.com/office/drawing/2014/main" xmlns="" val="10002"/>
+                    <a16:rowId xmlns="" xmlns:a16="http://schemas.microsoft.com/office/drawing/2014/main" val="10002"/>
                   </a:ext>
                 </a:extLst>
               </a:tr>
@@ -6149,7 +6149,7 @@
           <p:cNvPr id="5" name="角丸四角形吹き出し 4">
             <a:extLst>
               <a:ext uri="{FF2B5EF4-FFF2-40B4-BE49-F238E27FC236}">
-                <a16:creationId xmlns:a16="http://schemas.microsoft.com/office/drawing/2014/main" xmlns="" id="{7C4A849C-C639-B545-964A-5A275C1AAF89}"/>
+                <a16:creationId xmlns="" xmlns:a16="http://schemas.microsoft.com/office/drawing/2014/main" id="{7C4A849C-C639-B545-964A-5A275C1AAF89}"/>
               </a:ext>
             </a:extLst>
           </p:cNvPr>
@@ -6209,7 +6209,7 @@
           <p:cNvPr id="7" name="右矢印 6">
             <a:extLst>
               <a:ext uri="{FF2B5EF4-FFF2-40B4-BE49-F238E27FC236}">
-                <a16:creationId xmlns:a16="http://schemas.microsoft.com/office/drawing/2014/main" xmlns="" id="{191281F6-2AFD-2A49-8229-5047A536ECBE}"/>
+                <a16:creationId xmlns="" xmlns:a16="http://schemas.microsoft.com/office/drawing/2014/main" id="{191281F6-2AFD-2A49-8229-5047A536ECBE}"/>
               </a:ext>
             </a:extLst>
           </p:cNvPr>
@@ -6255,7 +6255,7 @@
           <p:cNvPr id="8" name="角丸四角形吹き出し 7">
             <a:extLst>
               <a:ext uri="{FF2B5EF4-FFF2-40B4-BE49-F238E27FC236}">
-                <a16:creationId xmlns:a16="http://schemas.microsoft.com/office/drawing/2014/main" xmlns="" id="{7C4A849C-C639-B545-964A-5A275C1AAF89}"/>
+                <a16:creationId xmlns="" xmlns:a16="http://schemas.microsoft.com/office/drawing/2014/main" id="{7C4A849C-C639-B545-964A-5A275C1AAF89}"/>
               </a:ext>
             </a:extLst>
           </p:cNvPr>
@@ -6421,14 +6421,14 @@
                 <a:gridCol w="1759688">
                   <a:extLst>
                     <a:ext uri="{9D8B030D-6E8A-4147-A177-3AD203B41FA5}">
-                      <a16:colId xmlns:a16="http://schemas.microsoft.com/office/drawing/2014/main" xmlns="" val="20000"/>
+                      <a16:colId xmlns="" xmlns:a16="http://schemas.microsoft.com/office/drawing/2014/main" val="20000"/>
                     </a:ext>
                   </a:extLst>
                 </a:gridCol>
                 <a:gridCol w="1759688">
                   <a:extLst>
                     <a:ext uri="{9D8B030D-6E8A-4147-A177-3AD203B41FA5}">
-                      <a16:colId xmlns:a16="http://schemas.microsoft.com/office/drawing/2014/main" xmlns="" val="20001"/>
+                      <a16:colId xmlns="" xmlns:a16="http://schemas.microsoft.com/office/drawing/2014/main" val="20001"/>
                     </a:ext>
                   </a:extLst>
                 </a:gridCol>
@@ -6542,7 +6542,7 @@
                 </a:tc>
                 <a:extLst>
                   <a:ext uri="{0D108BD9-81ED-4DB2-BD59-A6C34878D82A}">
-                    <a16:rowId xmlns:a16="http://schemas.microsoft.com/office/drawing/2014/main" xmlns="" val="10000"/>
+                    <a16:rowId xmlns="" xmlns:a16="http://schemas.microsoft.com/office/drawing/2014/main" val="10000"/>
                   </a:ext>
                 </a:extLst>
               </a:tr>
@@ -6655,7 +6655,7 @@
                 </a:tc>
                 <a:extLst>
                   <a:ext uri="{0D108BD9-81ED-4DB2-BD59-A6C34878D82A}">
-                    <a16:rowId xmlns:a16="http://schemas.microsoft.com/office/drawing/2014/main" xmlns="" val="10001"/>
+                    <a16:rowId xmlns="" xmlns:a16="http://schemas.microsoft.com/office/drawing/2014/main" val="10001"/>
                   </a:ext>
                 </a:extLst>
               </a:tr>
@@ -6768,7 +6768,7 @@
                 </a:tc>
                 <a:extLst>
                   <a:ext uri="{0D108BD9-81ED-4DB2-BD59-A6C34878D82A}">
-                    <a16:rowId xmlns:a16="http://schemas.microsoft.com/office/drawing/2014/main" xmlns="" val="10002"/>
+                    <a16:rowId xmlns="" xmlns:a16="http://schemas.microsoft.com/office/drawing/2014/main" val="10002"/>
                   </a:ext>
                 </a:extLst>
               </a:tr>
@@ -7569,7 +7569,7 @@
           <p:cNvPr id="2" name="タイトル 1">
             <a:extLst>
               <a:ext uri="{FF2B5EF4-FFF2-40B4-BE49-F238E27FC236}">
-                <a16:creationId xmlns="" xmlns:a16="http://schemas.microsoft.com/office/drawing/2014/main" id="{016F734A-24FF-C84E-9FFB-4573DBE9D77A}"/>
+                <a16:creationId xmlns:a16="http://schemas.microsoft.com/office/drawing/2014/main" xmlns="" id="{016F734A-24FF-C84E-9FFB-4573DBE9D77A}"/>
               </a:ext>
             </a:extLst>
           </p:cNvPr>
@@ -7598,7 +7598,7 @@
           <p:cNvPr id="3" name="コンテンツ プレースホルダー 2">
             <a:extLst>
               <a:ext uri="{FF2B5EF4-FFF2-40B4-BE49-F238E27FC236}">
-                <a16:creationId xmlns="" xmlns:a16="http://schemas.microsoft.com/office/drawing/2014/main" id="{B43A4BB1-C877-F449-B9D1-75A8406375A9}"/>
+                <a16:creationId xmlns:a16="http://schemas.microsoft.com/office/drawing/2014/main" xmlns="" id="{B43A4BB1-C877-F449-B9D1-75A8406375A9}"/>
               </a:ext>
             </a:extLst>
           </p:cNvPr>
@@ -9472,7 +9472,7 @@
           <p:cNvPr id="5" name="角丸四角形吹き出し 4">
             <a:extLst>
               <a:ext uri="{FF2B5EF4-FFF2-40B4-BE49-F238E27FC236}">
-                <a16:creationId xmlns:a16="http://schemas.microsoft.com/office/drawing/2014/main" xmlns="" id="{7C4A849C-C639-B545-964A-5A275C1AAF89}"/>
+                <a16:creationId xmlns="" xmlns:a16="http://schemas.microsoft.com/office/drawing/2014/main" id="{7C4A849C-C639-B545-964A-5A275C1AAF89}"/>
               </a:ext>
             </a:extLst>
           </p:cNvPr>
@@ -9589,7 +9589,7 @@
           <p:cNvPr id="2" name="タイトル 1">
             <a:extLst>
               <a:ext uri="{FF2B5EF4-FFF2-40B4-BE49-F238E27FC236}">
-                <a16:creationId xmlns="" xmlns:a16="http://schemas.microsoft.com/office/drawing/2014/main" id="{EFD7A861-05A9-7A46-98F3-9D64FFEE2A43}"/>
+                <a16:creationId xmlns:a16="http://schemas.microsoft.com/office/drawing/2014/main" xmlns="" id="{EFD7A861-05A9-7A46-98F3-9D64FFEE2A43}"/>
               </a:ext>
             </a:extLst>
           </p:cNvPr>
@@ -9618,7 +9618,7 @@
           <p:cNvPr id="3" name="テキスト プレースホルダー 2">
             <a:extLst>
               <a:ext uri="{FF2B5EF4-FFF2-40B4-BE49-F238E27FC236}">
-                <a16:creationId xmlns="" xmlns:a16="http://schemas.microsoft.com/office/drawing/2014/main" id="{13504C08-FAF4-D341-87C7-7921D878830A}"/>
+                <a16:creationId xmlns:a16="http://schemas.microsoft.com/office/drawing/2014/main" xmlns="" id="{13504C08-FAF4-D341-87C7-7921D878830A}"/>
               </a:ext>
             </a:extLst>
           </p:cNvPr>
@@ -9780,7 +9780,7 @@
           <p:cNvPr id="8" name="右矢印 7">
             <a:extLst>
               <a:ext uri="{FF2B5EF4-FFF2-40B4-BE49-F238E27FC236}">
-                <a16:creationId xmlns:a16="http://schemas.microsoft.com/office/drawing/2014/main" xmlns="" id="{191281F6-2AFD-2A49-8229-5047A536ECBE}"/>
+                <a16:creationId xmlns="" xmlns:a16="http://schemas.microsoft.com/office/drawing/2014/main" id="{191281F6-2AFD-2A49-8229-5047A536ECBE}"/>
               </a:ext>
             </a:extLst>
           </p:cNvPr>
@@ -9826,7 +9826,7 @@
           <p:cNvPr id="9" name="角丸四角形吹き出し 8">
             <a:extLst>
               <a:ext uri="{FF2B5EF4-FFF2-40B4-BE49-F238E27FC236}">
-                <a16:creationId xmlns:a16="http://schemas.microsoft.com/office/drawing/2014/main" xmlns="" id="{7C4A849C-C639-B545-964A-5A275C1AAF89}"/>
+                <a16:creationId xmlns="" xmlns:a16="http://schemas.microsoft.com/office/drawing/2014/main" id="{7C4A849C-C639-B545-964A-5A275C1AAF89}"/>
               </a:ext>
             </a:extLst>
           </p:cNvPr>
@@ -9878,7 +9878,7 @@
           <p:cNvPr id="10" name="角丸四角形吹き出し 9">
             <a:extLst>
               <a:ext uri="{FF2B5EF4-FFF2-40B4-BE49-F238E27FC236}">
-                <a16:creationId xmlns:a16="http://schemas.microsoft.com/office/drawing/2014/main" xmlns="" id="{7C4A849C-C639-B545-964A-5A275C1AAF89}"/>
+                <a16:creationId xmlns="" xmlns:a16="http://schemas.microsoft.com/office/drawing/2014/main" id="{7C4A849C-C639-B545-964A-5A275C1AAF89}"/>
               </a:ext>
             </a:extLst>
           </p:cNvPr>
@@ -10504,11 +10504,7 @@
             </a:r>
             <a:r>
               <a:rPr kumimoji="1" lang="ja-JP" altLang="en-US" dirty="0" smtClean="0"/>
-              <a:t>を</a:t>
-            </a:r>
-            <a:r>
-              <a:rPr kumimoji="1" lang="ja-JP" altLang="en-US" dirty="0" smtClean="0"/>
-              <a:t>切り替えて処理（</a:t>
+              <a:t>を切り替えて処理（</a:t>
             </a:r>
             <a:r>
               <a:rPr kumimoji="1" lang="en-US" altLang="ja-JP" dirty="0" smtClean="0"/>
@@ -11431,7 +11427,7 @@
           <p:cNvPr id="2" name="タイトル 1">
             <a:extLst>
               <a:ext uri="{FF2B5EF4-FFF2-40B4-BE49-F238E27FC236}">
-                <a16:creationId xmlns="" xmlns:a16="http://schemas.microsoft.com/office/drawing/2014/main" id="{EFD7A861-05A9-7A46-98F3-9D64FFEE2A43}"/>
+                <a16:creationId xmlns:a16="http://schemas.microsoft.com/office/drawing/2014/main" xmlns="" id="{EFD7A861-05A9-7A46-98F3-9D64FFEE2A43}"/>
               </a:ext>
             </a:extLst>
           </p:cNvPr>
@@ -11464,7 +11460,7 @@
           <p:cNvPr id="3" name="テキスト プレースホルダー 2">
             <a:extLst>
               <a:ext uri="{FF2B5EF4-FFF2-40B4-BE49-F238E27FC236}">
-                <a16:creationId xmlns="" xmlns:a16="http://schemas.microsoft.com/office/drawing/2014/main" id="{13504C08-FAF4-D341-87C7-7921D878830A}"/>
+                <a16:creationId xmlns:a16="http://schemas.microsoft.com/office/drawing/2014/main" xmlns="" id="{13504C08-FAF4-D341-87C7-7921D878830A}"/>
               </a:ext>
             </a:extLst>
           </p:cNvPr>
@@ -11648,12 +11644,6 @@
               </a:rPr>
               <a:t>()</a:t>
             </a:r>
-            <a:endParaRPr kumimoji="1" lang="en-US" altLang="ja-JP" sz="2000" dirty="0" smtClean="0">
-              <a:solidFill>
-                <a:srgbClr val="000000"/>
-              </a:solidFill>
-              <a:latin typeface="ＭＳ ゴシック" panose="020B0609070205080204" pitchFamily="49" charset="-128"/>
-            </a:endParaRPr>
           </a:p>
           <a:p>
             <a:r>
@@ -11699,16 +11689,7 @@
                 </a:solidFill>
                 <a:latin typeface="ＭＳ ゴシック" panose="020B0609070205080204" pitchFamily="49" charset="-128"/>
               </a:rPr>
-              <a:t>:\Expense_Claims_Mar2019.xlsx</a:t>
-            </a:r>
-            <a:r>
-              <a:rPr lang="en-US" altLang="ja-JP" sz="2000" dirty="0" smtClean="0">
-                <a:solidFill>
-                  <a:srgbClr val="000000"/>
-                </a:solidFill>
-                <a:latin typeface="ＭＳ ゴシック" panose="020B0609070205080204" pitchFamily="49" charset="-128"/>
-              </a:rPr>
-              <a:t>"</a:t>
+              <a:t>:\Expense_Claims_Mar2019.xlsx"</a:t>
             </a:r>
             <a:endParaRPr kumimoji="1" lang="en-US" altLang="ja-JP" sz="2000" dirty="0" smtClean="0">
               <a:solidFill>
@@ -11788,7 +11769,7 @@
           <p:cNvPr id="6" name="角丸四角形吹き出し 5">
             <a:extLst>
               <a:ext uri="{FF2B5EF4-FFF2-40B4-BE49-F238E27FC236}">
-                <a16:creationId xmlns:a16="http://schemas.microsoft.com/office/drawing/2014/main" xmlns="" id="{7C4A849C-C639-B545-964A-5A275C1AAF89}"/>
+                <a16:creationId xmlns="" xmlns:a16="http://schemas.microsoft.com/office/drawing/2014/main" id="{7C4A849C-C639-B545-964A-5A275C1AAF89}"/>
               </a:ext>
             </a:extLst>
           </p:cNvPr>
@@ -11848,7 +11829,7 @@
           <p:cNvPr id="7" name="角丸四角形吹き出し 6">
             <a:extLst>
               <a:ext uri="{FF2B5EF4-FFF2-40B4-BE49-F238E27FC236}">
-                <a16:creationId xmlns:a16="http://schemas.microsoft.com/office/drawing/2014/main" xmlns="" id="{7C4A849C-C639-B545-964A-5A275C1AAF89}"/>
+                <a16:creationId xmlns="" xmlns:a16="http://schemas.microsoft.com/office/drawing/2014/main" id="{7C4A849C-C639-B545-964A-5A275C1AAF89}"/>
               </a:ext>
             </a:extLst>
           </p:cNvPr>
@@ -11903,11 +11884,7 @@
             </a:r>
             <a:r>
               <a:rPr lang="ja-JP" altLang="en-US" sz="1600" dirty="0" smtClean="0"/>
-              <a:t>でファイル選択</a:t>
-            </a:r>
-            <a:r>
-              <a:rPr lang="ja-JP" altLang="en-US" sz="1600" dirty="0" smtClean="0"/>
-              <a:t>→メニューの「パスのコピー」をクリック</a:t>
+              <a:t>でファイル選択→メニューの「パスのコピー」をクリック</a:t>
             </a:r>
             <a:endParaRPr lang="en-US" altLang="ja-JP" sz="1600" dirty="0" smtClean="0"/>
           </a:p>
@@ -12133,7 +12110,7 @@
           <p:cNvPr id="8" name="角丸四角形吹き出し 7">
             <a:extLst>
               <a:ext uri="{FF2B5EF4-FFF2-40B4-BE49-F238E27FC236}">
-                <a16:creationId xmlns="" xmlns:a16="http://schemas.microsoft.com/office/drawing/2014/main" id="{7C4A849C-C639-B545-964A-5A275C1AAF89}"/>
+                <a16:creationId xmlns:a16="http://schemas.microsoft.com/office/drawing/2014/main" xmlns="" id="{7C4A849C-C639-B545-964A-5A275C1AAF89}"/>
               </a:ext>
             </a:extLst>
           </p:cNvPr>
@@ -12558,25 +12535,7 @@
                 </a:solidFill>
                 <a:latin typeface="ＭＳ ゴシック" panose="020B0609070205080204" pitchFamily="49" charset="-128"/>
               </a:rPr>
-              <a:t>"C</a:t>
-            </a:r>
-            <a:r>
-              <a:rPr lang="en-US" altLang="ja-JP" sz="2000" dirty="0" smtClean="0">
-                <a:solidFill>
-                  <a:srgbClr val="000000"/>
-                </a:solidFill>
-                <a:latin typeface="ＭＳ ゴシック" panose="020B0609070205080204" pitchFamily="49" charset="-128"/>
-              </a:rPr>
-              <a:t>:\Expense_Claims_Mar2019.xlsx</a:t>
-            </a:r>
-            <a:r>
-              <a:rPr lang="en-US" altLang="ja-JP" sz="2000" dirty="0" smtClean="0">
-                <a:solidFill>
-                  <a:srgbClr val="000000"/>
-                </a:solidFill>
-                <a:latin typeface="ＭＳ ゴシック" panose="020B0609070205080204" pitchFamily="49" charset="-128"/>
-              </a:rPr>
-              <a:t>")</a:t>
+              <a:t>"C:\Expense_Claims_Mar2019.xlsx")</a:t>
             </a:r>
             <a:endParaRPr kumimoji="1" lang="en-US" altLang="ja-JP" sz="2000" dirty="0" smtClean="0">
               <a:solidFill>
@@ -12982,25 +12941,7 @@
                 </a:solidFill>
                 <a:latin typeface="ＭＳ ゴシック" panose="020B0609070205080204" pitchFamily="49" charset="-128"/>
               </a:rPr>
-              <a:t>"C</a:t>
-            </a:r>
-            <a:r>
-              <a:rPr lang="en-US" altLang="ja-JP" sz="2000" dirty="0" smtClean="0">
-                <a:solidFill>
-                  <a:srgbClr val="000000"/>
-                </a:solidFill>
-                <a:latin typeface="ＭＳ ゴシック" panose="020B0609070205080204" pitchFamily="49" charset="-128"/>
-              </a:rPr>
-              <a:t>:\Expense_Claims_Mar2019.xlsx</a:t>
-            </a:r>
-            <a:r>
-              <a:rPr lang="en-US" altLang="ja-JP" sz="2000" dirty="0" smtClean="0">
-                <a:solidFill>
-                  <a:srgbClr val="000000"/>
-                </a:solidFill>
-                <a:latin typeface="ＭＳ ゴシック" panose="020B0609070205080204" pitchFamily="49" charset="-128"/>
-              </a:rPr>
-              <a:t>")</a:t>
+              <a:t>"C:\Expense_Claims_Mar2019.xlsx")</a:t>
             </a:r>
           </a:p>
           <a:p>
@@ -13079,7 +13020,7 @@
           <p:cNvPr id="5" name="角丸四角形吹き出し 4">
             <a:extLst>
               <a:ext uri="{FF2B5EF4-FFF2-40B4-BE49-F238E27FC236}">
-                <a16:creationId xmlns:a16="http://schemas.microsoft.com/office/drawing/2014/main" xmlns="" id="{7C4A849C-C639-B545-964A-5A275C1AAF89}"/>
+                <a16:creationId xmlns="" xmlns:a16="http://schemas.microsoft.com/office/drawing/2014/main" id="{7C4A849C-C639-B545-964A-5A275C1AAF89}"/>
               </a:ext>
             </a:extLst>
           </p:cNvPr>
@@ -13124,11 +13065,7 @@
             </a:r>
             <a:r>
               <a:rPr lang="ja-JP" altLang="en-US" sz="1600" dirty="0" smtClean="0"/>
-              <a:t>ファイルの変数に</a:t>
-            </a:r>
-            <a:r>
-              <a:rPr lang="ja-JP" altLang="en-US" sz="1600" dirty="0" smtClean="0"/>
-              <a:t>ドット</a:t>
+              <a:t>ファイルの変数にドット</a:t>
             </a:r>
             <a:r>
               <a:rPr lang="en-US" altLang="ja-JP" sz="1600" dirty="0" smtClean="0"/>
@@ -13724,16 +13661,7 @@
                 </a:solidFill>
                 <a:latin typeface="ＭＳ ゴシック" panose="020B0609070205080204" pitchFamily="49" charset="-128"/>
               </a:rPr>
-              <a:t>w</a:t>
-            </a:r>
-            <a:r>
-              <a:rPr lang="en-US" altLang="ja-JP" sz="1600" dirty="0" err="1" smtClean="0">
-                <a:solidFill>
-                  <a:srgbClr val="000000"/>
-                </a:solidFill>
-                <a:latin typeface="ＭＳ ゴシック" panose="020B0609070205080204" pitchFamily="49" charset="-128"/>
-              </a:rPr>
-              <a:t>s.Name</a:t>
+              <a:t>ws.Name</a:t>
             </a:r>
             <a:r>
               <a:rPr lang="en-US" altLang="ja-JP" sz="1600" dirty="0" smtClean="0">
@@ -13820,7 +13748,7 @@
           <p:cNvPr id="7" name="角丸四角形吹き出し 6">
             <a:extLst>
               <a:ext uri="{FF2B5EF4-FFF2-40B4-BE49-F238E27FC236}">
-                <a16:creationId xmlns:a16="http://schemas.microsoft.com/office/drawing/2014/main" xmlns="" id="{7C4A849C-C639-B545-964A-5A275C1AAF89}"/>
+                <a16:creationId xmlns="" xmlns:a16="http://schemas.microsoft.com/office/drawing/2014/main" id="{7C4A849C-C639-B545-964A-5A275C1AAF89}"/>
               </a:ext>
             </a:extLst>
           </p:cNvPr>
@@ -14187,25 +14115,7 @@
                 </a:solidFill>
                 <a:latin typeface="ＭＳ ゴシック" panose="020B0609070205080204" pitchFamily="49" charset="-128"/>
               </a:rPr>
-              <a:t>"C</a:t>
-            </a:r>
-            <a:r>
-              <a:rPr lang="en-US" altLang="ja-JP" sz="2000" dirty="0" smtClean="0">
-                <a:solidFill>
-                  <a:srgbClr val="000000"/>
-                </a:solidFill>
-                <a:latin typeface="ＭＳ ゴシック" panose="020B0609070205080204" pitchFamily="49" charset="-128"/>
-              </a:rPr>
-              <a:t>:\Expense_Claims_Mar2019.xlsx</a:t>
-            </a:r>
-            <a:r>
-              <a:rPr lang="en-US" altLang="ja-JP" sz="2000" dirty="0" smtClean="0">
-                <a:solidFill>
-                  <a:srgbClr val="000000"/>
-                </a:solidFill>
-                <a:latin typeface="ＭＳ ゴシック" panose="020B0609070205080204" pitchFamily="49" charset="-128"/>
-              </a:rPr>
-              <a:t>")</a:t>
+              <a:t>"C:\Expense_Claims_Mar2019.xlsx")</a:t>
             </a:r>
           </a:p>
           <a:p>
@@ -14618,25 +14528,7 @@
                 </a:solidFill>
                 <a:latin typeface="ＭＳ ゴシック" panose="020B0609070205080204" pitchFamily="49" charset="-128"/>
               </a:rPr>
-              <a:t>"C</a:t>
-            </a:r>
-            <a:r>
-              <a:rPr lang="en-US" altLang="ja-JP" sz="2000" dirty="0" smtClean="0">
-                <a:solidFill>
-                  <a:srgbClr val="000000"/>
-                </a:solidFill>
-                <a:latin typeface="ＭＳ ゴシック" panose="020B0609070205080204" pitchFamily="49" charset="-128"/>
-              </a:rPr>
-              <a:t>:\Expense_Claims_Mar2019.xlsx</a:t>
-            </a:r>
-            <a:r>
-              <a:rPr lang="en-US" altLang="ja-JP" sz="2000" dirty="0" smtClean="0">
-                <a:solidFill>
-                  <a:srgbClr val="000000"/>
-                </a:solidFill>
-                <a:latin typeface="ＭＳ ゴシック" panose="020B0609070205080204" pitchFamily="49" charset="-128"/>
-              </a:rPr>
-              <a:t>")</a:t>
+              <a:t>"C:\Expense_Claims_Mar2019.xlsx")</a:t>
             </a:r>
           </a:p>
           <a:p>
@@ -14775,7 +14667,7 @@
           <p:cNvPr id="2" name="タイトル 1">
             <a:extLst>
               <a:ext uri="{FF2B5EF4-FFF2-40B4-BE49-F238E27FC236}">
-                <a16:creationId xmlns="" xmlns:a16="http://schemas.microsoft.com/office/drawing/2014/main" id="{EFD7A861-05A9-7A46-98F3-9D64FFEE2A43}"/>
+                <a16:creationId xmlns:a16="http://schemas.microsoft.com/office/drawing/2014/main" xmlns="" id="{EFD7A861-05A9-7A46-98F3-9D64FFEE2A43}"/>
               </a:ext>
             </a:extLst>
           </p:cNvPr>
@@ -14808,7 +14700,7 @@
           <p:cNvPr id="3" name="テキスト プレースホルダー 2">
             <a:extLst>
               <a:ext uri="{FF2B5EF4-FFF2-40B4-BE49-F238E27FC236}">
-                <a16:creationId xmlns="" xmlns:a16="http://schemas.microsoft.com/office/drawing/2014/main" id="{13504C08-FAF4-D341-87C7-7921D878830A}"/>
+                <a16:creationId xmlns:a16="http://schemas.microsoft.com/office/drawing/2014/main" xmlns="" id="{13504C08-FAF4-D341-87C7-7921D878830A}"/>
               </a:ext>
             </a:extLst>
           </p:cNvPr>
@@ -15151,25 +15043,7 @@
                 </a:solidFill>
                 <a:latin typeface="ＭＳ ゴシック" panose="020B0609070205080204" pitchFamily="49" charset="-128"/>
               </a:rPr>
-              <a:t>"C</a:t>
-            </a:r>
-            <a:r>
-              <a:rPr lang="en-US" altLang="ja-JP" sz="2000" dirty="0" smtClean="0">
-                <a:solidFill>
-                  <a:srgbClr val="000000"/>
-                </a:solidFill>
-                <a:latin typeface="ＭＳ ゴシック" panose="020B0609070205080204" pitchFamily="49" charset="-128"/>
-              </a:rPr>
-              <a:t>:\Expense_Claims_Mar2019.xlsx</a:t>
-            </a:r>
-            <a:r>
-              <a:rPr lang="en-US" altLang="ja-JP" sz="2000" dirty="0" smtClean="0">
-                <a:solidFill>
-                  <a:srgbClr val="000000"/>
-                </a:solidFill>
-                <a:latin typeface="ＭＳ ゴシック" panose="020B0609070205080204" pitchFamily="49" charset="-128"/>
-              </a:rPr>
-              <a:t>")</a:t>
+              <a:t>"C:\Expense_Claims_Mar2019.xlsx")</a:t>
             </a:r>
           </a:p>
           <a:p>
@@ -17515,12 +17389,6 @@
               </a:rPr>
               <a:t>  </a:t>
             </a:r>
-            <a:endParaRPr lang="en-US" altLang="ja-JP" sz="2000" dirty="0" smtClean="0">
-              <a:solidFill>
-                <a:srgbClr val="297D53"/>
-              </a:solidFill>
-              <a:latin typeface="ＭＳ ゴシック" panose="020B0609070205080204" pitchFamily="49" charset="-128"/>
-            </a:endParaRPr>
           </a:p>
           <a:p>
             <a:endParaRPr kumimoji="1" lang="en-US" altLang="ja-JP" sz="2000" dirty="0" smtClean="0">
@@ -18971,7 +18839,7 @@
           <p:cNvPr id="8" name="角丸四角形吹き出し 7">
             <a:extLst>
               <a:ext uri="{FF2B5EF4-FFF2-40B4-BE49-F238E27FC236}">
-                <a16:creationId xmlns:a16="http://schemas.microsoft.com/office/drawing/2014/main" xmlns="" id="{7C4A849C-C639-B545-964A-5A275C1AAF89}"/>
+                <a16:creationId xmlns="" xmlns:a16="http://schemas.microsoft.com/office/drawing/2014/main" id="{7C4A849C-C639-B545-964A-5A275C1AAF89}"/>
               </a:ext>
             </a:extLst>
           </p:cNvPr>
@@ -19023,7 +18891,7 @@
           <p:cNvPr id="9" name="角丸四角形吹き出し 8">
             <a:extLst>
               <a:ext uri="{FF2B5EF4-FFF2-40B4-BE49-F238E27FC236}">
-                <a16:creationId xmlns:a16="http://schemas.microsoft.com/office/drawing/2014/main" xmlns="" id="{7C4A849C-C639-B545-964A-5A275C1AAF89}"/>
+                <a16:creationId xmlns="" xmlns:a16="http://schemas.microsoft.com/office/drawing/2014/main" id="{7C4A849C-C639-B545-964A-5A275C1AAF89}"/>
               </a:ext>
             </a:extLst>
           </p:cNvPr>
@@ -19121,7 +18989,7 @@
           <p:cNvPr id="2" name="タイトル 1">
             <a:extLst>
               <a:ext uri="{FF2B5EF4-FFF2-40B4-BE49-F238E27FC236}">
-                <a16:creationId xmlns="" xmlns:a16="http://schemas.microsoft.com/office/drawing/2014/main" id="{EFD7A861-05A9-7A46-98F3-9D64FFEE2A43}"/>
+                <a16:creationId xmlns:a16="http://schemas.microsoft.com/office/drawing/2014/main" xmlns="" id="{EFD7A861-05A9-7A46-98F3-9D64FFEE2A43}"/>
               </a:ext>
             </a:extLst>
           </p:cNvPr>
@@ -19154,7 +19022,7 @@
           <p:cNvPr id="3" name="テキスト プレースホルダー 2">
             <a:extLst>
               <a:ext uri="{FF2B5EF4-FFF2-40B4-BE49-F238E27FC236}">
-                <a16:creationId xmlns="" xmlns:a16="http://schemas.microsoft.com/office/drawing/2014/main" id="{13504C08-FAF4-D341-87C7-7921D878830A}"/>
+                <a16:creationId xmlns:a16="http://schemas.microsoft.com/office/drawing/2014/main" xmlns="" id="{13504C08-FAF4-D341-87C7-7921D878830A}"/>
               </a:ext>
             </a:extLst>
           </p:cNvPr>
@@ -20627,11 +20495,7 @@
             </a:r>
             <a:r>
               <a:rPr lang="ja-JP" altLang="en-US" dirty="0" smtClean="0"/>
-              <a:t>立替経費清算書を一覧表にまとめる</a:t>
-            </a:r>
-            <a:r>
-              <a:rPr lang="ja-JP" altLang="en-US" dirty="0" smtClean="0"/>
-              <a:t>ツールを</a:t>
+              <a:t>立替経費清算書を一覧表にまとめるツールを</a:t>
             </a:r>
             <a:r>
               <a:rPr lang="ja-JP" altLang="en-US" u="sng" dirty="0" smtClean="0">
@@ -20711,7 +20575,7 @@
           <p:cNvPr id="8" name="右矢印 7">
             <a:extLst>
               <a:ext uri="{FF2B5EF4-FFF2-40B4-BE49-F238E27FC236}">
-                <a16:creationId xmlns:a16="http://schemas.microsoft.com/office/drawing/2014/main" xmlns="" id="{191281F6-2AFD-2A49-8229-5047A536ECBE}"/>
+                <a16:creationId xmlns="" xmlns:a16="http://schemas.microsoft.com/office/drawing/2014/main" id="{191281F6-2AFD-2A49-8229-5047A536ECBE}"/>
               </a:ext>
             </a:extLst>
           </p:cNvPr>
@@ -20757,7 +20621,7 @@
           <p:cNvPr id="9" name="角丸四角形吹き出し 8">
             <a:extLst>
               <a:ext uri="{FF2B5EF4-FFF2-40B4-BE49-F238E27FC236}">
-                <a16:creationId xmlns:a16="http://schemas.microsoft.com/office/drawing/2014/main" xmlns="" id="{7C4A849C-C639-B545-964A-5A275C1AAF89}"/>
+                <a16:creationId xmlns="" xmlns:a16="http://schemas.microsoft.com/office/drawing/2014/main" id="{7C4A849C-C639-B545-964A-5A275C1AAF89}"/>
               </a:ext>
             </a:extLst>
           </p:cNvPr>
@@ -20809,7 +20673,7 @@
           <p:cNvPr id="10" name="角丸四角形吹き出し 9">
             <a:extLst>
               <a:ext uri="{FF2B5EF4-FFF2-40B4-BE49-F238E27FC236}">
-                <a16:creationId xmlns:a16="http://schemas.microsoft.com/office/drawing/2014/main" xmlns="" id="{7C4A849C-C639-B545-964A-5A275C1AAF89}"/>
+                <a16:creationId xmlns="" xmlns:a16="http://schemas.microsoft.com/office/drawing/2014/main" id="{7C4A849C-C639-B545-964A-5A275C1AAF89}"/>
               </a:ext>
             </a:extLst>
           </p:cNvPr>
@@ -21023,8 +20887,8 @@
         </p:nvSpPr>
         <p:spPr>
           <a:xfrm>
-            <a:off x="973189" y="2725917"/>
-            <a:ext cx="10798072" cy="3048270"/>
+            <a:off x="920778" y="2820824"/>
+            <a:ext cx="11026982" cy="3048270"/>
           </a:xfrm>
           <a:prstGeom prst="rect">
             <a:avLst/>
@@ -21497,16 +21361,16 @@
               <a:t>' </a:t>
             </a:r>
             <a:r>
-              <a:rPr lang="en-US" altLang="ja-JP" dirty="0">
+              <a:rPr lang="en-US" altLang="ja-JP" dirty="0" smtClean="0">
                 <a:solidFill>
                   <a:srgbClr val="297D53"/>
                 </a:solidFill>
                 <a:latin typeface="ＭＳ ゴシック" panose="020B0609070205080204" pitchFamily="49" charset="-128"/>
               </a:rPr>
-              <a:t>1</a:t>
-            </a:r>
-            <a:r>
-              <a:rPr lang="ja-JP" altLang="en-US" dirty="0">
+              <a:t>2</a:t>
+            </a:r>
+            <a:r>
+              <a:rPr lang="ja-JP" altLang="en-US" dirty="0" smtClean="0">
                 <a:solidFill>
                   <a:srgbClr val="297D53"/>
                 </a:solidFill>
@@ -21557,7 +21421,16 @@
                 </a:solidFill>
                 <a:latin typeface="ＭＳ ゴシック" panose="020B0609070205080204" pitchFamily="49" charset="-128"/>
               </a:rPr>
-              <a:t>を一覧表の</a:t>
+              <a:t>を一覧表</a:t>
+            </a:r>
+            <a:r>
+              <a:rPr lang="ja-JP" altLang="en-US" dirty="0" smtClean="0">
+                <a:solidFill>
+                  <a:srgbClr val="297D53"/>
+                </a:solidFill>
+                <a:latin typeface="ＭＳ ゴシック" panose="020B0609070205080204" pitchFamily="49" charset="-128"/>
+              </a:rPr>
+              <a:t>の</a:t>
             </a:r>
             <a:r>
               <a:rPr lang="en-US" altLang="ja-JP" dirty="0" smtClean="0">
@@ -21566,7 +21439,7 @@
                 </a:solidFill>
                 <a:latin typeface="ＭＳ ゴシック" panose="020B0609070205080204" pitchFamily="49" charset="-128"/>
               </a:rPr>
-              <a:t>1</a:t>
+              <a:t>2</a:t>
             </a:r>
             <a:r>
               <a:rPr lang="ja-JP" altLang="en-US" dirty="0" smtClean="0">
@@ -21575,7 +21448,16 @@
                 </a:solidFill>
                 <a:latin typeface="ＭＳ ゴシック" panose="020B0609070205080204" pitchFamily="49" charset="-128"/>
               </a:rPr>
-              <a:t>件目の行</a:t>
+              <a:t>件目</a:t>
+            </a:r>
+            <a:r>
+              <a:rPr lang="ja-JP" altLang="en-US" dirty="0" smtClean="0">
+                <a:solidFill>
+                  <a:srgbClr val="297D53"/>
+                </a:solidFill>
+                <a:latin typeface="ＭＳ ゴシック" panose="020B0609070205080204" pitchFamily="49" charset="-128"/>
+              </a:rPr>
+              <a:t>の行</a:t>
             </a:r>
             <a:r>
               <a:rPr lang="en-US" altLang="ja-JP" dirty="0" smtClean="0">
@@ -21584,7 +21466,7 @@
                 </a:solidFill>
                 <a:latin typeface="ＭＳ ゴシック" panose="020B0609070205080204" pitchFamily="49" charset="-128"/>
               </a:rPr>
-              <a:t>(2</a:t>
+              <a:t>(3</a:t>
             </a:r>
             <a:r>
               <a:rPr lang="ja-JP" altLang="en-US" dirty="0" smtClean="0">
@@ -21679,7 +21561,25 @@
                 </a:solidFill>
                 <a:latin typeface="ＭＳ ゴシック" panose="020B0609070205080204" pitchFamily="49" charset="-128"/>
               </a:rPr>
-              <a:t>+ 1, "A").Value = </a:t>
+              <a:t>+ </a:t>
+            </a:r>
+            <a:r>
+              <a:rPr lang="en-US" altLang="ja-JP" dirty="0" smtClean="0">
+                <a:solidFill>
+                  <a:srgbClr val="000000"/>
+                </a:solidFill>
+                <a:latin typeface="ＭＳ ゴシック" panose="020B0609070205080204" pitchFamily="49" charset="-128"/>
+              </a:rPr>
+              <a:t>2 - 1, </a:t>
+            </a:r>
+            <a:r>
+              <a:rPr lang="en-US" altLang="ja-JP" dirty="0" smtClean="0">
+                <a:solidFill>
+                  <a:srgbClr val="000000"/>
+                </a:solidFill>
+                <a:latin typeface="ＭＳ ゴシック" panose="020B0609070205080204" pitchFamily="49" charset="-128"/>
+              </a:rPr>
+              <a:t>"A").Value = </a:t>
             </a:r>
             <a:r>
               <a:rPr lang="en-US" altLang="ja-JP" dirty="0" err="1" smtClean="0">
@@ -21697,7 +21597,16 @@
                 </a:solidFill>
                 <a:latin typeface="ＭＳ ゴシック" panose="020B0609070205080204" pitchFamily="49" charset="-128"/>
               </a:rPr>
-              <a:t>(1).Range("B2").Value</a:t>
+              <a:t>(2).</a:t>
+            </a:r>
+            <a:r>
+              <a:rPr lang="en-US" altLang="ja-JP" dirty="0" smtClean="0">
+                <a:solidFill>
+                  <a:srgbClr val="000000"/>
+                </a:solidFill>
+                <a:latin typeface="ＭＳ ゴシック" panose="020B0609070205080204" pitchFamily="49" charset="-128"/>
+              </a:rPr>
+              <a:t>Range("B2").Value</a:t>
             </a:r>
             <a:endParaRPr lang="en-US" altLang="ja-JP" dirty="0">
               <a:solidFill>
@@ -21713,7 +21622,7 @@
           <p:cNvPr id="5" name="角丸四角形吹き出し 4">
             <a:extLst>
               <a:ext uri="{FF2B5EF4-FFF2-40B4-BE49-F238E27FC236}">
-                <a16:creationId xmlns:a16="http://schemas.microsoft.com/office/drawing/2014/main" xmlns="" id="{7C4A849C-C639-B545-964A-5A275C1AAF89}"/>
+                <a16:creationId xmlns="" xmlns:a16="http://schemas.microsoft.com/office/drawing/2014/main" id="{7C4A849C-C639-B545-964A-5A275C1AAF89}"/>
               </a:ext>
             </a:extLst>
           </p:cNvPr>
@@ -22311,7 +22220,7 @@
           <p:cNvPr id="7" name="角丸四角形吹き出し 6">
             <a:extLst>
               <a:ext uri="{FF2B5EF4-FFF2-40B4-BE49-F238E27FC236}">
-                <a16:creationId xmlns:a16="http://schemas.microsoft.com/office/drawing/2014/main" xmlns="" id="{7C4A849C-C639-B545-964A-5A275C1AAF89}"/>
+                <a16:creationId xmlns="" xmlns:a16="http://schemas.microsoft.com/office/drawing/2014/main" id="{7C4A849C-C639-B545-964A-5A275C1AAF89}"/>
               </a:ext>
             </a:extLst>
           </p:cNvPr>
@@ -22363,7 +22272,7 @@
           <p:cNvPr id="9" name="角丸四角形吹き出し 8">
             <a:extLst>
               <a:ext uri="{FF2B5EF4-FFF2-40B4-BE49-F238E27FC236}">
-                <a16:creationId xmlns:a16="http://schemas.microsoft.com/office/drawing/2014/main" xmlns="" id="{7C4A849C-C639-B545-964A-5A275C1AAF89}"/>
+                <a16:creationId xmlns="" xmlns:a16="http://schemas.microsoft.com/office/drawing/2014/main" id="{7C4A849C-C639-B545-964A-5A275C1AAF89}"/>
               </a:ext>
             </a:extLst>
           </p:cNvPr>
@@ -22531,7 +22440,7 @@
           <p:cNvPr id="2" name="タイトル 1">
             <a:extLst>
               <a:ext uri="{FF2B5EF4-FFF2-40B4-BE49-F238E27FC236}">
-                <a16:creationId xmlns="" xmlns:a16="http://schemas.microsoft.com/office/drawing/2014/main" id="{EFD7A861-05A9-7A46-98F3-9D64FFEE2A43}"/>
+                <a16:creationId xmlns:a16="http://schemas.microsoft.com/office/drawing/2014/main" xmlns="" id="{EFD7A861-05A9-7A46-98F3-9D64FFEE2A43}"/>
               </a:ext>
             </a:extLst>
           </p:cNvPr>
@@ -22559,7 +22468,7 @@
           <p:cNvPr id="3" name="テキスト プレースホルダー 2">
             <a:extLst>
               <a:ext uri="{FF2B5EF4-FFF2-40B4-BE49-F238E27FC236}">
-                <a16:creationId xmlns="" xmlns:a16="http://schemas.microsoft.com/office/drawing/2014/main" id="{13504C08-FAF4-D341-87C7-7921D878830A}"/>
+                <a16:creationId xmlns:a16="http://schemas.microsoft.com/office/drawing/2014/main" xmlns="" id="{13504C08-FAF4-D341-87C7-7921D878830A}"/>
               </a:ext>
             </a:extLst>
           </p:cNvPr>
@@ -22809,7 +22718,7 @@
           <p:cNvPr id="2" name="タイトル 1">
             <a:extLst>
               <a:ext uri="{FF2B5EF4-FFF2-40B4-BE49-F238E27FC236}">
-                <a16:creationId xmlns="" xmlns:a16="http://schemas.microsoft.com/office/drawing/2014/main" id="{016F734A-24FF-C84E-9FFB-4573DBE9D77A}"/>
+                <a16:creationId xmlns:a16="http://schemas.microsoft.com/office/drawing/2014/main" xmlns="" id="{016F734A-24FF-C84E-9FFB-4573DBE9D77A}"/>
               </a:ext>
             </a:extLst>
           </p:cNvPr>
@@ -22846,7 +22755,7 @@
           <p:cNvPr id="3" name="コンテンツ プレースホルダー 2">
             <a:extLst>
               <a:ext uri="{FF2B5EF4-FFF2-40B4-BE49-F238E27FC236}">
-                <a16:creationId xmlns="" xmlns:a16="http://schemas.microsoft.com/office/drawing/2014/main" id="{B43A4BB1-C877-F449-B9D1-75A8406375A9}"/>
+                <a16:creationId xmlns:a16="http://schemas.microsoft.com/office/drawing/2014/main" xmlns="" id="{B43A4BB1-C877-F449-B9D1-75A8406375A9}"/>
               </a:ext>
             </a:extLst>
           </p:cNvPr>
@@ -24079,7 +23988,7 @@
           <p:cNvPr id="11" name="角丸四角形吹き出し 10">
             <a:extLst>
               <a:ext uri="{FF2B5EF4-FFF2-40B4-BE49-F238E27FC236}">
-                <a16:creationId xmlns="" xmlns:a16="http://schemas.microsoft.com/office/drawing/2014/main" id="{7C4A849C-C639-B545-964A-5A275C1AAF89}"/>
+                <a16:creationId xmlns:a16="http://schemas.microsoft.com/office/drawing/2014/main" xmlns="" id="{7C4A849C-C639-B545-964A-5A275C1AAF89}"/>
               </a:ext>
             </a:extLst>
           </p:cNvPr>
@@ -24196,7 +24105,7 @@
           <p:cNvPr id="2" name="タイトル 1">
             <a:extLst>
               <a:ext uri="{FF2B5EF4-FFF2-40B4-BE49-F238E27FC236}">
-                <a16:creationId xmlns="" xmlns:a16="http://schemas.microsoft.com/office/drawing/2014/main" id="{016F734A-24FF-C84E-9FFB-4573DBE9D77A}"/>
+                <a16:creationId xmlns:a16="http://schemas.microsoft.com/office/drawing/2014/main" xmlns="" id="{016F734A-24FF-C84E-9FFB-4573DBE9D77A}"/>
               </a:ext>
             </a:extLst>
           </p:cNvPr>
@@ -24245,7 +24154,7 @@
           <p:cNvPr id="3" name="コンテンツ プレースホルダー 2">
             <a:extLst>
               <a:ext uri="{FF2B5EF4-FFF2-40B4-BE49-F238E27FC236}">
-                <a16:creationId xmlns="" xmlns:a16="http://schemas.microsoft.com/office/drawing/2014/main" id="{B43A4BB1-C877-F449-B9D1-75A8406375A9}"/>
+                <a16:creationId xmlns:a16="http://schemas.microsoft.com/office/drawing/2014/main" xmlns="" id="{B43A4BB1-C877-F449-B9D1-75A8406375A9}"/>
               </a:ext>
             </a:extLst>
           </p:cNvPr>
@@ -25513,7 +25422,7 @@
           <p:cNvPr id="6" name="上矢印 5">
             <a:extLst>
               <a:ext uri="{FF2B5EF4-FFF2-40B4-BE49-F238E27FC236}">
-                <a16:creationId xmlns="" xmlns:a16="http://schemas.microsoft.com/office/drawing/2014/main" id="{191281F6-2AFD-2A49-8229-5047A536ECBE}"/>
+                <a16:creationId xmlns:a16="http://schemas.microsoft.com/office/drawing/2014/main" xmlns="" id="{191281F6-2AFD-2A49-8229-5047A536ECBE}"/>
               </a:ext>
             </a:extLst>
           </p:cNvPr>
@@ -25608,7 +25517,7 @@
           <p:cNvPr id="2" name="タイトル 1">
             <a:extLst>
               <a:ext uri="{FF2B5EF4-FFF2-40B4-BE49-F238E27FC236}">
-                <a16:creationId xmlns="" xmlns:a16="http://schemas.microsoft.com/office/drawing/2014/main" id="{016F734A-24FF-C84E-9FFB-4573DBE9D77A}"/>
+                <a16:creationId xmlns:a16="http://schemas.microsoft.com/office/drawing/2014/main" xmlns="" id="{016F734A-24FF-C84E-9FFB-4573DBE9D77A}"/>
               </a:ext>
             </a:extLst>
           </p:cNvPr>
@@ -25653,7 +25562,7 @@
           <p:cNvPr id="3" name="コンテンツ プレースホルダー 2">
             <a:extLst>
               <a:ext uri="{FF2B5EF4-FFF2-40B4-BE49-F238E27FC236}">
-                <a16:creationId xmlns="" xmlns:a16="http://schemas.microsoft.com/office/drawing/2014/main" id="{B43A4BB1-C877-F449-B9D1-75A8406375A9}"/>
+                <a16:creationId xmlns:a16="http://schemas.microsoft.com/office/drawing/2014/main" xmlns="" id="{B43A4BB1-C877-F449-B9D1-75A8406375A9}"/>
               </a:ext>
             </a:extLst>
           </p:cNvPr>
@@ -26557,7 +26466,7 @@
           <p:cNvPr id="4" name="角丸四角形吹き出し 3">
             <a:extLst>
               <a:ext uri="{FF2B5EF4-FFF2-40B4-BE49-F238E27FC236}">
-                <a16:creationId xmlns="" xmlns:a16="http://schemas.microsoft.com/office/drawing/2014/main" id="{7C4A849C-C639-B545-964A-5A275C1AAF89}"/>
+                <a16:creationId xmlns:a16="http://schemas.microsoft.com/office/drawing/2014/main" xmlns="" id="{7C4A849C-C639-B545-964A-5A275C1AAF89}"/>
               </a:ext>
             </a:extLst>
           </p:cNvPr>
@@ -27482,6 +27391,21 @@
 </file>
 
 <file path=customXml/item1.xml><?xml version="1.0" encoding="utf-8"?>
+<?mso-contentType ?>
+<FormTemplates xmlns="http://schemas.microsoft.com/sharepoint/v3/contenttype/forms">
+  <Display>DocumentLibraryForm</Display>
+  <Edit>DocumentLibraryForm</Edit>
+  <New>DocumentLibraryForm</New>
+</FormTemplates>
+</file>
+
+<file path=customXml/item2.xml><?xml version="1.0" encoding="utf-8"?>
+<p:properties xmlns:p="http://schemas.microsoft.com/office/2006/metadata/properties" xmlns:xsi="http://www.w3.org/2001/XMLSchema-instance" xmlns:pc="http://schemas.microsoft.com/office/infopath/2007/PartnerControls">
+  <documentManagement/>
+</p:properties>
+</file>
+
+<file path=customXml/item3.xml><?xml version="1.0" encoding="utf-8"?>
 <ct:contentTypeSchema xmlns:ct="http://schemas.microsoft.com/office/2006/metadata/contentType" xmlns:ma="http://schemas.microsoft.com/office/2006/metadata/properties/metaAttributes" ct:_="" ma:_="" ma:contentTypeName="Document" ma:contentTypeID="0x0101004E64C1B9759C00439C3492CBBE953EC6" ma:contentTypeVersion="4" ma:contentTypeDescription="Create a new document." ma:contentTypeScope="" ma:versionID="4614ffbef66646ade257425cb756d12b">
   <xsd:schema xmlns:xsd="http://www.w3.org/2001/XMLSchema" xmlns:xs="http://www.w3.org/2001/XMLSchema" xmlns:p="http://schemas.microsoft.com/office/2006/metadata/properties" xmlns:ns2="9eef16d1-88bd-4aa8-b0cb-d3a7752e6d6b" xmlns:ns3="4dd0d71b-5951-40d7-bab3-745c65abb58f" targetNamespace="http://schemas.microsoft.com/office/2006/metadata/properties" ma:root="true" ma:fieldsID="beb1781d3191e837f14064601f5f8d07" ns2:_="" ns3:_="">
     <xsd:import namespace="9eef16d1-88bd-4aa8-b0cb-d3a7752e6d6b"/>
@@ -27646,36 +27570,10 @@
 </ct:contentTypeSchema>
 </file>
 
-<file path=customXml/item2.xml><?xml version="1.0" encoding="utf-8"?>
-<p:properties xmlns:p="http://schemas.microsoft.com/office/2006/metadata/properties" xmlns:xsi="http://www.w3.org/2001/XMLSchema-instance" xmlns:pc="http://schemas.microsoft.com/office/infopath/2007/PartnerControls">
-  <documentManagement/>
-</p:properties>
-</file>
-
-<file path=customXml/item3.xml><?xml version="1.0" encoding="utf-8"?>
-<?mso-contentType ?>
-<FormTemplates xmlns="http://schemas.microsoft.com/sharepoint/v3/contenttype/forms">
-  <Display>DocumentLibraryForm</Display>
-  <Edit>DocumentLibraryForm</Edit>
-  <New>DocumentLibraryForm</New>
-</FormTemplates>
-</file>
-
 <file path=customXml/itemProps1.xml><?xml version="1.0" encoding="utf-8"?>
-<ds:datastoreItem xmlns:ds="http://schemas.openxmlformats.org/officeDocument/2006/customXml" ds:itemID="{CB89F443-BEFB-44E3-950C-F541E1B82E45}">
+<ds:datastoreItem xmlns:ds="http://schemas.openxmlformats.org/officeDocument/2006/customXml" ds:itemID="{E6EF3CE6-42BA-4728-84B7-42F4006F77DE}">
   <ds:schemaRefs>
-    <ds:schemaRef ds:uri="http://schemas.microsoft.com/office/2006/metadata/contentType"/>
-    <ds:schemaRef ds:uri="http://schemas.microsoft.com/office/2006/metadata/properties/metaAttributes"/>
-    <ds:schemaRef ds:uri="http://www.w3.org/2001/XMLSchema"/>
-    <ds:schemaRef ds:uri="http://schemas.microsoft.com/office/2006/metadata/properties"/>
-    <ds:schemaRef ds:uri="9eef16d1-88bd-4aa8-b0cb-d3a7752e6d6b"/>
-    <ds:schemaRef ds:uri="4dd0d71b-5951-40d7-bab3-745c65abb58f"/>
-    <ds:schemaRef ds:uri="http://schemas.microsoft.com/office/2006/documentManagement/types"/>
-    <ds:schemaRef ds:uri="http://schemas.microsoft.com/office/infopath/2007/PartnerControls"/>
-    <ds:schemaRef ds:uri="http://schemas.openxmlformats.org/package/2006/metadata/core-properties"/>
-    <ds:schemaRef ds:uri="http://purl.org/dc/elements/1.1/"/>
-    <ds:schemaRef ds:uri="http://purl.org/dc/terms/"/>
-    <ds:schemaRef ds:uri="http://schemas.microsoft.com/internal/obd"/>
+    <ds:schemaRef ds:uri="http://schemas.microsoft.com/sharepoint/v3/contenttype/forms"/>
   </ds:schemaRefs>
 </ds:datastoreItem>
 </file>
@@ -27698,9 +27596,20 @@
 </file>
 
 <file path=customXml/itemProps3.xml><?xml version="1.0" encoding="utf-8"?>
-<ds:datastoreItem xmlns:ds="http://schemas.openxmlformats.org/officeDocument/2006/customXml" ds:itemID="{E6EF3CE6-42BA-4728-84B7-42F4006F77DE}">
+<ds:datastoreItem xmlns:ds="http://schemas.openxmlformats.org/officeDocument/2006/customXml" ds:itemID="{CB89F443-BEFB-44E3-950C-F541E1B82E45}">
   <ds:schemaRefs>
-    <ds:schemaRef ds:uri="http://schemas.microsoft.com/sharepoint/v3/contenttype/forms"/>
+    <ds:schemaRef ds:uri="http://schemas.microsoft.com/office/2006/metadata/contentType"/>
+    <ds:schemaRef ds:uri="http://schemas.microsoft.com/office/2006/metadata/properties/metaAttributes"/>
+    <ds:schemaRef ds:uri="http://www.w3.org/2001/XMLSchema"/>
+    <ds:schemaRef ds:uri="http://schemas.microsoft.com/office/2006/metadata/properties"/>
+    <ds:schemaRef ds:uri="9eef16d1-88bd-4aa8-b0cb-d3a7752e6d6b"/>
+    <ds:schemaRef ds:uri="4dd0d71b-5951-40d7-bab3-745c65abb58f"/>
+    <ds:schemaRef ds:uri="http://schemas.microsoft.com/office/2006/documentManagement/types"/>
+    <ds:schemaRef ds:uri="http://schemas.microsoft.com/office/infopath/2007/PartnerControls"/>
+    <ds:schemaRef ds:uri="http://schemas.openxmlformats.org/package/2006/metadata/core-properties"/>
+    <ds:schemaRef ds:uri="http://purl.org/dc/elements/1.1/"/>
+    <ds:schemaRef ds:uri="http://purl.org/dc/terms/"/>
+    <ds:schemaRef ds:uri="http://schemas.microsoft.com/internal/obd"/>
   </ds:schemaRefs>
 </ds:datastoreItem>
 </file>
</xml_diff>